<commit_message>
Aggiunta modifica a slide
</commit_message>
<xml_diff>
--- a/Presentazioni/Presentazione_Pozzato.pptx
+++ b/Presentazioni/Presentazione_Pozzato.pptx
@@ -600,7 +600,7 @@
           <a:p>
             <a:fld id="{B64B7556-49F2-4736-B3F9-00EDF3B414DB}" type="datetimeFigureOut">
               <a:rPr lang="it-IT" smtClean="0"/>
-              <a:t>04/06/2022</a:t>
+              <a:t>05/06/2022</a:t>
             </a:fld>
             <a:endParaRPr lang="it-IT"/>
           </a:p>
@@ -798,7 +798,7 @@
           <a:p>
             <a:fld id="{B64B7556-49F2-4736-B3F9-00EDF3B414DB}" type="datetimeFigureOut">
               <a:rPr lang="it-IT" smtClean="0"/>
-              <a:t>04/06/2022</a:t>
+              <a:t>05/06/2022</a:t>
             </a:fld>
             <a:endParaRPr lang="it-IT"/>
           </a:p>
@@ -1006,7 +1006,7 @@
           <a:p>
             <a:fld id="{B64B7556-49F2-4736-B3F9-00EDF3B414DB}" type="datetimeFigureOut">
               <a:rPr lang="it-IT" smtClean="0"/>
-              <a:t>04/06/2022</a:t>
+              <a:t>05/06/2022</a:t>
             </a:fld>
             <a:endParaRPr lang="it-IT"/>
           </a:p>
@@ -1204,7 +1204,7 @@
           <a:p>
             <a:fld id="{B64B7556-49F2-4736-B3F9-00EDF3B414DB}" type="datetimeFigureOut">
               <a:rPr lang="it-IT" smtClean="0"/>
-              <a:t>04/06/2022</a:t>
+              <a:t>05/06/2022</a:t>
             </a:fld>
             <a:endParaRPr lang="it-IT"/>
           </a:p>
@@ -1479,7 +1479,7 @@
           <a:p>
             <a:fld id="{B64B7556-49F2-4736-B3F9-00EDF3B414DB}" type="datetimeFigureOut">
               <a:rPr lang="it-IT" smtClean="0"/>
-              <a:t>04/06/2022</a:t>
+              <a:t>05/06/2022</a:t>
             </a:fld>
             <a:endParaRPr lang="it-IT"/>
           </a:p>
@@ -1744,7 +1744,7 @@
           <a:p>
             <a:fld id="{B64B7556-49F2-4736-B3F9-00EDF3B414DB}" type="datetimeFigureOut">
               <a:rPr lang="it-IT" smtClean="0"/>
-              <a:t>04/06/2022</a:t>
+              <a:t>05/06/2022</a:t>
             </a:fld>
             <a:endParaRPr lang="it-IT"/>
           </a:p>
@@ -2156,7 +2156,7 @@
           <a:p>
             <a:fld id="{B64B7556-49F2-4736-B3F9-00EDF3B414DB}" type="datetimeFigureOut">
               <a:rPr lang="it-IT" smtClean="0"/>
-              <a:t>04/06/2022</a:t>
+              <a:t>05/06/2022</a:t>
             </a:fld>
             <a:endParaRPr lang="it-IT"/>
           </a:p>
@@ -2297,7 +2297,7 @@
           <a:p>
             <a:fld id="{B64B7556-49F2-4736-B3F9-00EDF3B414DB}" type="datetimeFigureOut">
               <a:rPr lang="it-IT" smtClean="0"/>
-              <a:t>04/06/2022</a:t>
+              <a:t>05/06/2022</a:t>
             </a:fld>
             <a:endParaRPr lang="it-IT"/>
           </a:p>
@@ -2410,7 +2410,7 @@
           <a:p>
             <a:fld id="{B64B7556-49F2-4736-B3F9-00EDF3B414DB}" type="datetimeFigureOut">
               <a:rPr lang="it-IT" smtClean="0"/>
-              <a:t>04/06/2022</a:t>
+              <a:t>05/06/2022</a:t>
             </a:fld>
             <a:endParaRPr lang="it-IT"/>
           </a:p>
@@ -2721,7 +2721,7 @@
           <a:p>
             <a:fld id="{B64B7556-49F2-4736-B3F9-00EDF3B414DB}" type="datetimeFigureOut">
               <a:rPr lang="it-IT" smtClean="0"/>
-              <a:t>04/06/2022</a:t>
+              <a:t>05/06/2022</a:t>
             </a:fld>
             <a:endParaRPr lang="it-IT"/>
           </a:p>
@@ -3009,7 +3009,7 @@
           <a:p>
             <a:fld id="{B64B7556-49F2-4736-B3F9-00EDF3B414DB}" type="datetimeFigureOut">
               <a:rPr lang="it-IT" smtClean="0"/>
-              <a:t>04/06/2022</a:t>
+              <a:t>05/06/2022</a:t>
             </a:fld>
             <a:endParaRPr lang="it-IT"/>
           </a:p>
@@ -3250,7 +3250,7 @@
           <a:p>
             <a:fld id="{B64B7556-49F2-4736-B3F9-00EDF3B414DB}" type="datetimeFigureOut">
               <a:rPr lang="it-IT" smtClean="0"/>
-              <a:t>04/06/2022</a:t>
+              <a:t>05/06/2022</a:t>
             </a:fld>
             <a:endParaRPr lang="it-IT"/>
           </a:p>
@@ -3964,35 +3964,6 @@
           <a:chExt cx="0" cy="0"/>
         </a:xfrm>
       </p:grpSpPr>
-      <p:pic>
-        <p:nvPicPr>
-          <p:cNvPr id="6" name="Segnaposto contenuto 5">
-            <a:extLst>
-              <a:ext uri="{FF2B5EF4-FFF2-40B4-BE49-F238E27FC236}">
-                <a16:creationId xmlns:a16="http://schemas.microsoft.com/office/drawing/2014/main" id="{A89FE7B8-0D14-47DB-A095-64DFAAA54E72}"/>
-              </a:ext>
-            </a:extLst>
-          </p:cNvPr>
-          <p:cNvPicPr>
-            <a:picLocks noGrp="1" noChangeAspect="1"/>
-          </p:cNvPicPr>
-          <p:nvPr>
-            <p:ph idx="1"/>
-          </p:nvPr>
-        </p:nvPicPr>
-        <p:blipFill>
-          <a:blip r:embed="rId2"/>
-          <a:stretch>
-            <a:fillRect/>
-          </a:stretch>
-        </p:blipFill>
-        <p:spPr>
-          <a:xfrm>
-            <a:off x="1728253" y="3429000"/>
-            <a:ext cx="6359303" cy="529942"/>
-          </a:xfrm>
-        </p:spPr>
-      </p:pic>
       <p:sp>
         <p:nvSpPr>
           <p:cNvPr id="4" name="Segnaposto testo 3">
@@ -4162,10 +4133,39 @@
       </p:sp>
       <p:pic>
         <p:nvPicPr>
-          <p:cNvPr id="9" name="Immagine 8">
-            <a:extLst>
-              <a:ext uri="{FF2B5EF4-FFF2-40B4-BE49-F238E27FC236}">
-                <a16:creationId xmlns:a16="http://schemas.microsoft.com/office/drawing/2014/main" id="{0CE2C22D-1A8F-4FD2-A741-9CB9F29A0576}"/>
+          <p:cNvPr id="8" name="Segnaposto contenuto 7">
+            <a:extLst>
+              <a:ext uri="{FF2B5EF4-FFF2-40B4-BE49-F238E27FC236}">
+                <a16:creationId xmlns:a16="http://schemas.microsoft.com/office/drawing/2014/main" id="{0FFF5CB3-3F7B-4E19-A0A3-B234512A52CD}"/>
+              </a:ext>
+            </a:extLst>
+          </p:cNvPr>
+          <p:cNvPicPr>
+            <a:picLocks noGrp="1" noChangeAspect="1"/>
+          </p:cNvPicPr>
+          <p:nvPr>
+            <p:ph idx="1"/>
+          </p:nvPr>
+        </p:nvPicPr>
+        <p:blipFill>
+          <a:blip r:embed="rId2"/>
+          <a:stretch>
+            <a:fillRect/>
+          </a:stretch>
+        </p:blipFill>
+        <p:spPr>
+          <a:xfrm>
+            <a:off x="1649876" y="3428999"/>
+            <a:ext cx="7609534" cy="707269"/>
+          </a:xfrm>
+        </p:spPr>
+      </p:pic>
+      <p:pic>
+        <p:nvPicPr>
+          <p:cNvPr id="11" name="Immagine 10">
+            <a:extLst>
+              <a:ext uri="{FF2B5EF4-FFF2-40B4-BE49-F238E27FC236}">
+                <a16:creationId xmlns:a16="http://schemas.microsoft.com/office/drawing/2014/main" id="{F99432F6-4DA4-4FDE-A6FB-442BBF59E3C7}"/>
               </a:ext>
             </a:extLst>
           </p:cNvPr>
@@ -4182,8 +4182,8 @@
         </p:blipFill>
         <p:spPr>
           <a:xfrm>
-            <a:off x="1728253" y="1703631"/>
-            <a:ext cx="6359304" cy="564277"/>
+            <a:off x="1649876" y="1763635"/>
+            <a:ext cx="6544213" cy="556954"/>
           </a:xfrm>
           <a:prstGeom prst="rect">
             <a:avLst/>
@@ -4355,8 +4355,8 @@
         </p:nvSpPr>
         <p:spPr>
           <a:xfrm>
-            <a:off x="839787" y="5193437"/>
-            <a:ext cx="10656795" cy="923330"/>
+            <a:off x="839787" y="4920871"/>
+            <a:ext cx="10656795" cy="1754326"/>
           </a:xfrm>
           <a:prstGeom prst="rect">
             <a:avLst/>
@@ -4379,6 +4379,20 @@
               <a:rPr lang="it-IT" dirty="0"/>
               <a:t>Di seguito abbiamo messo il calendario proposto come soluzione dopo l’esecuzione della prima prova</a:t>
             </a:r>
+          </a:p>
+          <a:p>
+            <a:endParaRPr lang="it-IT" dirty="0"/>
+          </a:p>
+          <a:p>
+            <a:r>
+              <a:rPr lang="it-IT" dirty="0"/>
+              <a:t>Il programma presenta anche una stampa  «#show assegna/3.» che mostra l’assegnamento delle squadre ai rispettivi stadi. Per una migliore lettura del calendario è stata commenta ma è possibile </a:t>
+            </a:r>
+            <a:r>
+              <a:rPr lang="it-IT"/>
+              <a:t>farla eseguire.</a:t>
+            </a:r>
+            <a:endParaRPr lang="it-IT" dirty="0"/>
           </a:p>
         </p:txBody>
       </p:sp>

</xml_diff>